<commit_message>
v0.5 (time stamp added)
</commit_message>
<xml_diff>
--- a/hotrfc-shreq.pptx
+++ b/hotrfc-shreq.pptx
@@ -184,14 +184,7 @@
                 <a:latin typeface="Arial" panose="020B0604020202020204" pitchFamily="34" charset="0"/>
                 <a:cs typeface="Arial" panose="020B0604020202020204" pitchFamily="34" charset="0"/>
               </a:rPr>
-              <a:t>, IETF-104, </a:t>
-            </a:r>
-            <a:r>
-              <a:rPr lang="en-US" sz="800" dirty="0" smtClean="0">
-                <a:latin typeface="Arial" panose="020B0604020202020204" pitchFamily="34" charset="0"/>
-                <a:cs typeface="Arial" panose="020B0604020202020204" pitchFamily="34" charset="0"/>
-              </a:rPr>
-              <a:t>Prague, v0.4</a:t>
+              <a:t>, IETF-104, Prague, v0.5</a:t>
             </a:r>
             <a:endParaRPr lang="en-US" sz="800" dirty="0">
               <a:latin typeface="Arial" panose="020B0604020202020204" pitchFamily="34" charset="0"/>
@@ -423,7 +416,7 @@
           <a:p>
             <a:fld id="{7C758894-9002-4FBF-9EED-56D555428090}" type="datetimeFigureOut">
               <a:rPr lang="en-US" smtClean="0"/>
-              <a:t>2019-02-26</a:t>
+              <a:t>2019-02-28</a:t>
             </a:fld>
             <a:endParaRPr lang="en-US"/>
           </a:p>
@@ -1455,8 +1448,8 @@
         </p:nvSpPr>
         <p:spPr>
           <a:xfrm>
-            <a:off x="1115616" y="1196752"/>
-            <a:ext cx="6276142" cy="2554545"/>
+            <a:off x="1110120" y="1196752"/>
+            <a:ext cx="5901167" cy="2862322"/>
           </a:xfrm>
           <a:prstGeom prst="rect">
             <a:avLst/>
@@ -1474,7 +1467,7 @@
           <a:lstStyle/>
           <a:p>
             <a:r>
-              <a:rPr lang="en-US" sz="3200" i="1" dirty="0" smtClean="0"/>
+              <a:rPr lang="en-US" sz="3000" i="1" dirty="0" smtClean="0"/>
               <a:t>Signs these items:</a:t>
             </a:r>
           </a:p>
@@ -1484,7 +1477,7 @@
               <a:buChar char="•"/>
             </a:pPr>
             <a:r>
-              <a:rPr lang="en-US" sz="3200" dirty="0" smtClean="0"/>
+              <a:rPr lang="en-US" sz="3000" dirty="0" smtClean="0"/>
               <a:t>HTTP URI</a:t>
             </a:r>
           </a:p>
@@ -1494,7 +1487,7 @@
               <a:buChar char="•"/>
             </a:pPr>
             <a:r>
-              <a:rPr lang="en-US" sz="3200" dirty="0" smtClean="0"/>
+              <a:rPr lang="en-US" sz="3000" dirty="0" smtClean="0"/>
               <a:t>HTTP Method</a:t>
             </a:r>
           </a:p>
@@ -1504,7 +1497,7 @@
               <a:buChar char="•"/>
             </a:pPr>
             <a:r>
-              <a:rPr lang="en-US" sz="3200" dirty="0" smtClean="0"/>
+              <a:rPr lang="en-US" sz="3000" dirty="0" smtClean="0"/>
               <a:t>HTTP Body (if applicable)</a:t>
             </a:r>
           </a:p>
@@ -1514,10 +1507,20 @@
               <a:buChar char="•"/>
             </a:pPr>
             <a:r>
-              <a:rPr lang="en-US" sz="3200" dirty="0" smtClean="0"/>
+              <a:rPr lang="en-US" sz="3000" dirty="0" smtClean="0"/>
+              <a:t>Time Stamp</a:t>
+            </a:r>
+          </a:p>
+          <a:p>
+            <a:pPr marL="285750" indent="-285750">
+              <a:buFont typeface="Arial" panose="020B0604020202020204" pitchFamily="34" charset="0"/>
+              <a:buChar char="•"/>
+            </a:pPr>
+            <a:r>
+              <a:rPr lang="en-US" sz="3000" dirty="0" smtClean="0"/>
               <a:t>Optional: Additional HTTP Headers</a:t>
             </a:r>
-            <a:endParaRPr lang="en-US" sz="3200" dirty="0"/>
+            <a:endParaRPr lang="en-US" sz="3000" dirty="0"/>
           </a:p>
         </p:txBody>
       </p:sp>
@@ -1529,8 +1532,8 @@
         </p:nvSpPr>
         <p:spPr>
           <a:xfrm>
-            <a:off x="1122836" y="4149080"/>
-            <a:ext cx="6689524" cy="2062103"/>
+            <a:off x="1122836" y="4298320"/>
+            <a:ext cx="6295506" cy="1938992"/>
           </a:xfrm>
           <a:prstGeom prst="rect">
             <a:avLst/>
@@ -1548,7 +1551,7 @@
           <a:lstStyle/>
           <a:p>
             <a:r>
-              <a:rPr lang="en-US" sz="3200" i="1" dirty="0" smtClean="0"/>
+              <a:rPr lang="en-US" sz="3000" i="1" dirty="0" smtClean="0"/>
               <a:t>Other characteristics:</a:t>
             </a:r>
           </a:p>
@@ -1558,7 +1561,7 @@
               <a:buChar char="•"/>
             </a:pPr>
             <a:r>
-              <a:rPr lang="en-US" sz="3200" dirty="0" smtClean="0"/>
+              <a:rPr lang="en-US" sz="3000" dirty="0" smtClean="0"/>
               <a:t>JSON Oriented (for POST/PUT/PATCH)</a:t>
             </a:r>
           </a:p>
@@ -1568,7 +1571,7 @@
               <a:buChar char="•"/>
             </a:pPr>
             <a:r>
-              <a:rPr lang="en-US" sz="3200" dirty="0" smtClean="0"/>
+              <a:rPr lang="en-US" sz="3000" dirty="0" smtClean="0"/>
               <a:t>Signed Requests are Serializable </a:t>
             </a:r>
           </a:p>
@@ -1578,7 +1581,7 @@
               <a:buChar char="•"/>
             </a:pPr>
             <a:r>
-              <a:rPr lang="en-US" sz="3200" dirty="0" smtClean="0"/>
+              <a:rPr lang="en-US" sz="3000" dirty="0" smtClean="0"/>
               <a:t>Cryptography builds on JOSE-JWS</a:t>
             </a:r>
           </a:p>
@@ -2403,7 +2406,7 @@
         <p:spPr>
           <a:xfrm>
             <a:off x="395536" y="980728"/>
-            <a:ext cx="8615130" cy="5693866"/>
+            <a:ext cx="8615130" cy="5632311"/>
           </a:xfrm>
           <a:prstGeom prst="rect">
             <a:avLst/>
@@ -2417,7 +2420,7 @@
           <a:lstStyle/>
           <a:p>
             <a:r>
-              <a:rPr lang="en-US" sz="2600" dirty="0" smtClean="0">
+              <a:rPr lang="en-US" sz="2400" dirty="0" smtClean="0">
                 <a:solidFill>
                   <a:schemeClr val="bg1">
                     <a:lumMod val="50000"/>
@@ -2429,14 +2432,14 @@
               <a:t>POST</a:t>
             </a:r>
             <a:r>
-              <a:rPr lang="en-US" sz="2600" dirty="0" smtClean="0">
+              <a:rPr lang="en-US" sz="2400" dirty="0" smtClean="0">
                 <a:latin typeface="Arial" panose="020B0604020202020204" pitchFamily="34" charset="0"/>
                 <a:cs typeface="Arial" panose="020B0604020202020204" pitchFamily="34" charset="0"/>
               </a:rPr>
               <a:t> /transact/pay </a:t>
             </a:r>
             <a:r>
-              <a:rPr lang="en-US" sz="2600" dirty="0" smtClean="0">
+              <a:rPr lang="en-US" sz="2400" dirty="0" smtClean="0">
                 <a:solidFill>
                   <a:schemeClr val="bg1">
                     <a:lumMod val="50000"/>
@@ -2448,20 +2451,20 @@
               <a:t>HTTP/1.1</a:t>
             </a:r>
             <a:r>
-              <a:rPr lang="en-US" sz="2600" dirty="0" smtClean="0">
+              <a:rPr lang="en-US" sz="2400" dirty="0" smtClean="0">
                 <a:latin typeface="Arial" panose="020B0604020202020204" pitchFamily="34" charset="0"/>
                 <a:cs typeface="Arial" panose="020B0604020202020204" pitchFamily="34" charset="0"/>
               </a:rPr>
               <a:t/>
             </a:r>
             <a:br>
-              <a:rPr lang="en-US" sz="2600" dirty="0" smtClean="0">
+              <a:rPr lang="en-US" sz="2400" dirty="0" smtClean="0">
                 <a:latin typeface="Arial" panose="020B0604020202020204" pitchFamily="34" charset="0"/>
                 <a:cs typeface="Arial" panose="020B0604020202020204" pitchFamily="34" charset="0"/>
               </a:rPr>
             </a:br>
             <a:r>
-              <a:rPr lang="en-US" sz="2600" dirty="0" smtClean="0">
+              <a:rPr lang="en-US" sz="2400" dirty="0" smtClean="0">
                 <a:solidFill>
                   <a:schemeClr val="bg1">
                     <a:lumMod val="50000"/>
@@ -2473,20 +2476,20 @@
               <a:t>Host: </a:t>
             </a:r>
             <a:r>
-              <a:rPr lang="en-US" sz="2600" dirty="0" smtClean="0">
+              <a:rPr lang="en-US" sz="2400" dirty="0" smtClean="0">
                 <a:latin typeface="Arial" panose="020B0604020202020204" pitchFamily="34" charset="0"/>
                 <a:cs typeface="Arial" panose="020B0604020202020204" pitchFamily="34" charset="0"/>
               </a:rPr>
               <a:t>example.com</a:t>
             </a:r>
             <a:br>
-              <a:rPr lang="en-US" sz="2600" dirty="0" smtClean="0">
+              <a:rPr lang="en-US" sz="2400" dirty="0" smtClean="0">
                 <a:latin typeface="Arial" panose="020B0604020202020204" pitchFamily="34" charset="0"/>
                 <a:cs typeface="Arial" panose="020B0604020202020204" pitchFamily="34" charset="0"/>
               </a:rPr>
             </a:br>
             <a:r>
-              <a:rPr lang="en-US" sz="2600" dirty="0" smtClean="0">
+              <a:rPr lang="en-US" sz="2400" dirty="0" smtClean="0">
                 <a:solidFill>
                   <a:schemeClr val="bg1">
                     <a:lumMod val="50000"/>
@@ -2498,34 +2501,34 @@
               <a:t>Content-Type: </a:t>
             </a:r>
             <a:r>
-              <a:rPr lang="en-US" sz="2600" dirty="0" smtClean="0">
+              <a:rPr lang="en-US" sz="2400" dirty="0" smtClean="0">
                 <a:latin typeface="Arial" panose="020B0604020202020204" pitchFamily="34" charset="0"/>
                 <a:cs typeface="Arial" panose="020B0604020202020204" pitchFamily="34" charset="0"/>
               </a:rPr>
               <a:t>application/</a:t>
             </a:r>
             <a:r>
-              <a:rPr lang="en-US" sz="2600" dirty="0" err="1" smtClean="0">
+              <a:rPr lang="en-US" sz="2400" dirty="0" err="1" smtClean="0">
                 <a:latin typeface="Arial" panose="020B0604020202020204" pitchFamily="34" charset="0"/>
                 <a:cs typeface="Arial" panose="020B0604020202020204" pitchFamily="34" charset="0"/>
               </a:rPr>
               <a:t>json</a:t>
             </a:r>
             <a:r>
-              <a:rPr lang="en-US" sz="2600" dirty="0">
+              <a:rPr lang="en-US" sz="2400" dirty="0">
                 <a:latin typeface="Arial" panose="020B0604020202020204" pitchFamily="34" charset="0"/>
                 <a:cs typeface="Arial" panose="020B0604020202020204" pitchFamily="34" charset="0"/>
               </a:rPr>
               <a:t/>
             </a:r>
             <a:br>
-              <a:rPr lang="en-US" sz="2600" dirty="0">
+              <a:rPr lang="en-US" sz="2400" dirty="0">
                 <a:latin typeface="Arial" panose="020B0604020202020204" pitchFamily="34" charset="0"/>
                 <a:cs typeface="Arial" panose="020B0604020202020204" pitchFamily="34" charset="0"/>
               </a:rPr>
             </a:br>
             <a:r>
-              <a:rPr lang="en-US" sz="2600" dirty="0" smtClean="0">
+              <a:rPr lang="en-US" sz="2400" dirty="0" smtClean="0">
                 <a:solidFill>
                   <a:schemeClr val="bg1">
                     <a:lumMod val="50000"/>
@@ -2537,7 +2540,7 @@
               <a:t>Content-Length: </a:t>
             </a:r>
             <a:r>
-              <a:rPr lang="en-US" sz="2600" dirty="0" smtClean="0">
+              <a:rPr lang="en-US" sz="2400" dirty="0" smtClean="0">
                 <a:latin typeface="Arial" panose="020B0604020202020204" pitchFamily="34" charset="0"/>
                 <a:cs typeface="Arial" panose="020B0604020202020204" pitchFamily="34" charset="0"/>
               </a:rPr>
@@ -2545,14 +2548,14 @@
             </a:r>
           </a:p>
           <a:p>
-            <a:endParaRPr lang="en-US" sz="2600" dirty="0">
+            <a:endParaRPr lang="en-US" sz="2400" dirty="0">
               <a:latin typeface="Arial" panose="020B0604020202020204" pitchFamily="34" charset="0"/>
               <a:cs typeface="Arial" panose="020B0604020202020204" pitchFamily="34" charset="0"/>
             </a:endParaRPr>
           </a:p>
           <a:p>
             <a:r>
-              <a:rPr lang="en-US" sz="2600" dirty="0" smtClean="0">
+              <a:rPr lang="en-US" sz="2400" dirty="0" smtClean="0">
                 <a:latin typeface="Arial" panose="020B0604020202020204" pitchFamily="34" charset="0"/>
                 <a:cs typeface="Arial" panose="020B0604020202020204" pitchFamily="34" charset="0"/>
               </a:rPr>
@@ -2561,14 +2564,14 @@
           </a:p>
           <a:p>
             <a:r>
-              <a:rPr lang="en-US" sz="2600" dirty="0" smtClean="0">
+              <a:rPr lang="en-US" sz="2400" dirty="0" smtClean="0">
                 <a:latin typeface="Arial" panose="020B0604020202020204" pitchFamily="34" charset="0"/>
                 <a:cs typeface="Arial" panose="020B0604020202020204" pitchFamily="34" charset="0"/>
               </a:rPr>
               <a:t>    "</a:t>
             </a:r>
             <a:r>
-              <a:rPr lang="en-US" sz="2600" dirty="0" err="1" smtClean="0">
+              <a:rPr lang="en-US" sz="2400" dirty="0" err="1" smtClean="0">
                 <a:solidFill>
                   <a:srgbClr val="FF0000"/>
                 </a:solidFill>
@@ -2578,14 +2581,14 @@
               <a:t>payme</a:t>
             </a:r>
             <a:r>
-              <a:rPr lang="en-US" sz="2600" dirty="0" smtClean="0">
+              <a:rPr lang="en-US" sz="2400" dirty="0" smtClean="0">
                 <a:latin typeface="Arial" panose="020B0604020202020204" pitchFamily="34" charset="0"/>
                 <a:cs typeface="Arial" panose="020B0604020202020204" pitchFamily="34" charset="0"/>
               </a:rPr>
               <a:t>": "</a:t>
             </a:r>
             <a:r>
-              <a:rPr lang="en-US" sz="2600" dirty="0" smtClean="0">
+              <a:rPr lang="en-US" sz="2400" dirty="0" smtClean="0">
                 <a:solidFill>
                   <a:schemeClr val="accent1">
                     <a:lumMod val="75000"/>
@@ -2597,7 +2600,7 @@
               <a:t>10000000000.99</a:t>
             </a:r>
             <a:r>
-              <a:rPr lang="en-US" sz="2600" dirty="0" smtClean="0">
+              <a:rPr lang="en-US" sz="2400" dirty="0" smtClean="0">
                 <a:latin typeface="Arial" panose="020B0604020202020204" pitchFamily="34" charset="0"/>
                 <a:cs typeface="Arial" panose="020B0604020202020204" pitchFamily="34" charset="0"/>
               </a:rPr>
@@ -2606,14 +2609,14 @@
           </a:p>
           <a:p>
             <a:r>
-              <a:rPr lang="en-US" sz="2600" dirty="0" smtClean="0">
+              <a:rPr lang="en-US" sz="2400" dirty="0" smtClean="0">
                 <a:latin typeface="Arial" panose="020B0604020202020204" pitchFamily="34" charset="0"/>
                 <a:cs typeface="Arial" panose="020B0604020202020204" pitchFamily="34" charset="0"/>
               </a:rPr>
               <a:t>    "</a:t>
             </a:r>
             <a:r>
-              <a:rPr lang="en-US" sz="2600" dirty="0" smtClean="0">
+              <a:rPr lang="en-US" sz="2400" dirty="0" smtClean="0">
                 <a:solidFill>
                   <a:srgbClr val="FF0000"/>
                 </a:solidFill>
@@ -2623,14 +2626,14 @@
               <a:t>currency</a:t>
             </a:r>
             <a:r>
-              <a:rPr lang="en-US" sz="2600" dirty="0" smtClean="0">
+              <a:rPr lang="en-US" sz="2400" dirty="0" smtClean="0">
                 <a:latin typeface="Arial" panose="020B0604020202020204" pitchFamily="34" charset="0"/>
                 <a:cs typeface="Arial" panose="020B0604020202020204" pitchFamily="34" charset="0"/>
               </a:rPr>
               <a:t>": "</a:t>
             </a:r>
             <a:r>
-              <a:rPr lang="en-US" sz="2600" dirty="0" smtClean="0">
+              <a:rPr lang="en-US" sz="2400" dirty="0" smtClean="0">
                 <a:solidFill>
                   <a:schemeClr val="accent1">
                     <a:lumMod val="75000"/>
@@ -2642,7 +2645,7 @@
               <a:t>USD</a:t>
             </a:r>
             <a:r>
-              <a:rPr lang="en-US" sz="2600" dirty="0" smtClean="0">
+              <a:rPr lang="en-US" sz="2400" dirty="0" smtClean="0">
                 <a:latin typeface="Arial" panose="020B0604020202020204" pitchFamily="34" charset="0"/>
                 <a:cs typeface="Arial" panose="020B0604020202020204" pitchFamily="34" charset="0"/>
               </a:rPr>
@@ -2651,21 +2654,21 @@
           </a:p>
           <a:p>
             <a:r>
-              <a:rPr lang="en-US" sz="2600" dirty="0">
+              <a:rPr lang="en-US" sz="2400" dirty="0">
                 <a:latin typeface="Arial" panose="020B0604020202020204" pitchFamily="34" charset="0"/>
                 <a:cs typeface="Arial" panose="020B0604020202020204" pitchFamily="34" charset="0"/>
               </a:rPr>
               <a:t> </a:t>
             </a:r>
             <a:r>
-              <a:rPr lang="en-US" sz="2600" dirty="0" smtClean="0">
+              <a:rPr lang="en-US" sz="2400" dirty="0" smtClean="0">
                 <a:latin typeface="Arial" panose="020B0604020202020204" pitchFamily="34" charset="0"/>
                 <a:cs typeface="Arial" panose="020B0604020202020204" pitchFamily="34" charset="0"/>
               </a:rPr>
               <a:t>   "</a:t>
             </a:r>
             <a:r>
-              <a:rPr lang="en-US" sz="2600" dirty="0" smtClean="0">
+              <a:rPr lang="en-US" sz="2400" dirty="0" smtClean="0">
                 <a:solidFill>
                   <a:srgbClr val="FF0000"/>
                 </a:solidFill>
@@ -2675,7 +2678,7 @@
               <a:t>$</a:t>
             </a:r>
             <a:r>
-              <a:rPr lang="en-US" sz="2600" dirty="0" err="1" smtClean="0">
+              <a:rPr lang="en-US" sz="2400" dirty="0" err="1" smtClean="0">
                 <a:solidFill>
                   <a:srgbClr val="FF0000"/>
                 </a:solidFill>
@@ -2685,7 +2688,7 @@
               <a:t>secinf</a:t>
             </a:r>
             <a:r>
-              <a:rPr lang="en-US" sz="2600" dirty="0" smtClean="0">
+              <a:rPr lang="en-US" sz="2400" dirty="0" smtClean="0">
                 <a:solidFill>
                   <a:srgbClr val="FF0000"/>
                 </a:solidFill>
@@ -2695,51 +2698,89 @@
               <a:t>$</a:t>
             </a:r>
             <a:r>
-              <a:rPr lang="en-US" sz="2600" dirty="0" smtClean="0">
+              <a:rPr lang="en-US" sz="2400" dirty="0" smtClean="0">
                 <a:latin typeface="Arial" panose="020B0604020202020204" pitchFamily="34" charset="0"/>
                 <a:cs typeface="Arial" panose="020B0604020202020204" pitchFamily="34" charset="0"/>
               </a:rPr>
               <a:t>": {</a:t>
             </a:r>
-            <a:endParaRPr lang="en-US" sz="2600" dirty="0" smtClean="0">
+          </a:p>
+          <a:p>
+            <a:r>
+              <a:rPr lang="en-US" sz="2400" dirty="0" smtClean="0">
+                <a:latin typeface="Arial" panose="020B0604020202020204" pitchFamily="34" charset="0"/>
+                <a:cs typeface="Arial" panose="020B0604020202020204" pitchFamily="34" charset="0"/>
+              </a:rPr>
+              <a:t>        "</a:t>
+            </a:r>
+            <a:r>
+              <a:rPr lang="en-US" sz="2400" dirty="0" err="1" smtClean="0">
+                <a:solidFill>
+                  <a:srgbClr val="FF0000"/>
+                </a:solidFill>
+                <a:latin typeface="Arial" panose="020B0604020202020204" pitchFamily="34" charset="0"/>
+                <a:cs typeface="Arial" panose="020B0604020202020204" pitchFamily="34" charset="0"/>
+              </a:rPr>
+              <a:t>uri</a:t>
+            </a:r>
+            <a:r>
+              <a:rPr lang="en-US" sz="2400" dirty="0" smtClean="0">
+                <a:latin typeface="Arial" panose="020B0604020202020204" pitchFamily="34" charset="0"/>
+                <a:cs typeface="Arial" panose="020B0604020202020204" pitchFamily="34" charset="0"/>
+              </a:rPr>
+              <a:t>": "</a:t>
+            </a:r>
+            <a:r>
+              <a:rPr lang="en-US" sz="2400" dirty="0" smtClean="0">
+                <a:solidFill>
+                  <a:schemeClr val="accent1">
+                    <a:lumMod val="75000"/>
+                  </a:schemeClr>
+                </a:solidFill>
+                <a:latin typeface="Arial" panose="020B0604020202020204" pitchFamily="34" charset="0"/>
+                <a:cs typeface="Arial" panose="020B0604020202020204" pitchFamily="34" charset="0"/>
+              </a:rPr>
+              <a:t>https://example.com/transact/pay</a:t>
+            </a:r>
+            <a:r>
+              <a:rPr lang="en-US" sz="2400" dirty="0" smtClean="0">
+                <a:latin typeface="Arial" panose="020B0604020202020204" pitchFamily="34" charset="0"/>
+                <a:cs typeface="Arial" panose="020B0604020202020204" pitchFamily="34" charset="0"/>
+              </a:rPr>
+              <a:t>",</a:t>
+            </a:r>
+            <a:endParaRPr lang="en-US" sz="2400" dirty="0">
               <a:latin typeface="Arial" panose="020B0604020202020204" pitchFamily="34" charset="0"/>
               <a:cs typeface="Arial" panose="020B0604020202020204" pitchFamily="34" charset="0"/>
             </a:endParaRPr>
           </a:p>
           <a:p>
             <a:r>
-              <a:rPr lang="en-US" sz="2600" dirty="0" smtClean="0">
-                <a:latin typeface="Arial" panose="020B0604020202020204" pitchFamily="34" charset="0"/>
-                <a:cs typeface="Arial" panose="020B0604020202020204" pitchFamily="34" charset="0"/>
-              </a:rPr>
-              <a:t>   </a:t>
-            </a:r>
-            <a:r>
-              <a:rPr lang="en-US" sz="2600" dirty="0" smtClean="0">
-                <a:latin typeface="Arial" panose="020B0604020202020204" pitchFamily="34" charset="0"/>
-                <a:cs typeface="Arial" panose="020B0604020202020204" pitchFamily="34" charset="0"/>
-              </a:rPr>
-              <a:t>     "</a:t>
-            </a:r>
-            <a:r>
-              <a:rPr lang="en-US" sz="2600" dirty="0" err="1" smtClean="0">
+              <a:rPr lang="en-US" sz="2400" dirty="0" smtClean="0">
+                <a:latin typeface="Arial" panose="020B0604020202020204" pitchFamily="34" charset="0"/>
+                <a:cs typeface="Arial" panose="020B0604020202020204" pitchFamily="34" charset="0"/>
+              </a:rPr>
+              <a:t>        "</a:t>
+            </a:r>
+            <a:r>
+              <a:rPr lang="en-US" sz="2400" dirty="0" err="1" smtClean="0">
                 <a:solidFill>
                   <a:srgbClr val="FF0000"/>
                 </a:solidFill>
                 <a:latin typeface="Arial" panose="020B0604020202020204" pitchFamily="34" charset="0"/>
                 <a:cs typeface="Arial" panose="020B0604020202020204" pitchFamily="34" charset="0"/>
               </a:rPr>
-              <a:t>uri</a:t>
-            </a:r>
-            <a:r>
-              <a:rPr lang="en-US" sz="2600" dirty="0" smtClean="0">
+              <a:t>mtd</a:t>
+            </a:r>
+            <a:r>
+              <a:rPr lang="en-US" sz="2400" dirty="0" smtClean="0">
                 <a:latin typeface="Arial" panose="020B0604020202020204" pitchFamily="34" charset="0"/>
                 <a:cs typeface="Arial" panose="020B0604020202020204" pitchFamily="34" charset="0"/>
               </a:rPr>
               <a:t>": "</a:t>
             </a:r>
             <a:r>
-              <a:rPr lang="en-US" sz="2600" dirty="0" smtClean="0">
+              <a:rPr lang="en-US" sz="2400" dirty="0" smtClean="0">
                 <a:solidFill>
                   <a:schemeClr val="accent1">
                     <a:lumMod val="75000"/>
@@ -2748,54 +2789,88 @@
                 <a:latin typeface="Arial" panose="020B0604020202020204" pitchFamily="34" charset="0"/>
                 <a:cs typeface="Arial" panose="020B0604020202020204" pitchFamily="34" charset="0"/>
               </a:rPr>
-              <a:t>https://example.com/transact/pay</a:t>
-            </a:r>
-            <a:r>
-              <a:rPr lang="en-US" sz="2600" dirty="0" smtClean="0">
+              <a:t>POST</a:t>
+            </a:r>
+            <a:r>
+              <a:rPr lang="en-US" sz="2400" dirty="0" smtClean="0">
                 <a:latin typeface="Arial" panose="020B0604020202020204" pitchFamily="34" charset="0"/>
                 <a:cs typeface="Arial" panose="020B0604020202020204" pitchFamily="34" charset="0"/>
               </a:rPr>
               <a:t>",</a:t>
             </a:r>
-            <a:endParaRPr lang="en-US" sz="2600" dirty="0">
-              <a:latin typeface="Arial" panose="020B0604020202020204" pitchFamily="34" charset="0"/>
-              <a:cs typeface="Arial" panose="020B0604020202020204" pitchFamily="34" charset="0"/>
-            </a:endParaRPr>
-          </a:p>
-          <a:p>
-            <a:r>
-              <a:rPr lang="en-US" sz="2600" dirty="0" smtClean="0">
-                <a:latin typeface="Arial" panose="020B0604020202020204" pitchFamily="34" charset="0"/>
-                <a:cs typeface="Arial" panose="020B0604020202020204" pitchFamily="34" charset="0"/>
-              </a:rPr>
-              <a:t>  </a:t>
-            </a:r>
-            <a:r>
-              <a:rPr lang="en-US" sz="2600" dirty="0" smtClean="0">
-                <a:latin typeface="Arial" panose="020B0604020202020204" pitchFamily="34" charset="0"/>
-                <a:cs typeface="Arial" panose="020B0604020202020204" pitchFamily="34" charset="0"/>
-              </a:rPr>
-              <a:t>      "</a:t>
-            </a:r>
-            <a:r>
-              <a:rPr lang="en-US" sz="2600" dirty="0" err="1" smtClean="0">
+          </a:p>
+          <a:p>
+            <a:r>
+              <a:rPr lang="en-US" sz="2400" dirty="0" smtClean="0">
+                <a:latin typeface="Arial" panose="020B0604020202020204" pitchFamily="34" charset="0"/>
+                <a:cs typeface="Arial" panose="020B0604020202020204" pitchFamily="34" charset="0"/>
+              </a:rPr>
+              <a:t>        "</a:t>
+            </a:r>
+            <a:r>
+              <a:rPr lang="en-US" sz="2400" dirty="0" err="1" smtClean="0">
                 <a:solidFill>
                   <a:srgbClr val="FF0000"/>
                 </a:solidFill>
                 <a:latin typeface="Arial" panose="020B0604020202020204" pitchFamily="34" charset="0"/>
                 <a:cs typeface="Arial" panose="020B0604020202020204" pitchFamily="34" charset="0"/>
               </a:rPr>
-              <a:t>mtd</a:t>
-            </a:r>
-            <a:r>
-              <a:rPr lang="en-US" sz="2600" dirty="0" smtClean="0">
+              <a:t>iat</a:t>
+            </a:r>
+            <a:r>
+              <a:rPr lang="en-US" sz="2400" dirty="0" smtClean="0">
+                <a:latin typeface="Arial" panose="020B0604020202020204" pitchFamily="34" charset="0"/>
+                <a:cs typeface="Arial" panose="020B0604020202020204" pitchFamily="34" charset="0"/>
+              </a:rPr>
+              <a:t>": </a:t>
+            </a:r>
+            <a:r>
+              <a:rPr lang="en-US" sz="2400" dirty="0">
+                <a:solidFill>
+                  <a:schemeClr val="accent3">
+                    <a:lumMod val="75000"/>
+                  </a:schemeClr>
+                </a:solidFill>
+                <a:latin typeface="Arial" panose="020B0604020202020204" pitchFamily="34" charset="0"/>
+                <a:cs typeface="Arial" panose="020B0604020202020204" pitchFamily="34" charset="0"/>
+              </a:rPr>
+              <a:t>1551361123</a:t>
+            </a:r>
+            <a:r>
+              <a:rPr lang="en-US" sz="2400" dirty="0" smtClean="0">
+                <a:latin typeface="Arial" panose="020B0604020202020204" pitchFamily="34" charset="0"/>
+                <a:cs typeface="Arial" panose="020B0604020202020204" pitchFamily="34" charset="0"/>
+              </a:rPr>
+              <a:t>,</a:t>
+            </a:r>
+          </a:p>
+          <a:p>
+            <a:r>
+              <a:rPr lang="en-US" sz="2400" dirty="0" smtClean="0">
+                <a:latin typeface="Arial" panose="020B0604020202020204" pitchFamily="34" charset="0"/>
+                <a:cs typeface="Arial" panose="020B0604020202020204" pitchFamily="34" charset="0"/>
+              </a:rPr>
+              <a:t>        "</a:t>
+            </a:r>
+            <a:r>
+              <a:rPr lang="en-US" sz="2400" dirty="0" err="1" smtClean="0">
+                <a:solidFill>
+                  <a:srgbClr val="FF0000"/>
+                </a:solidFill>
+                <a:latin typeface="Arial" panose="020B0604020202020204" pitchFamily="34" charset="0"/>
+                <a:cs typeface="Arial" panose="020B0604020202020204" pitchFamily="34" charset="0"/>
+              </a:rPr>
+              <a:t>jws</a:t>
+            </a:r>
+            <a:r>
+              <a:rPr lang="en-US" sz="2400" dirty="0" smtClean="0">
                 <a:latin typeface="Arial" panose="020B0604020202020204" pitchFamily="34" charset="0"/>
                 <a:cs typeface="Arial" panose="020B0604020202020204" pitchFamily="34" charset="0"/>
               </a:rPr>
               <a:t>": "</a:t>
             </a:r>
             <a:r>
-              <a:rPr lang="en-US" sz="2600" dirty="0" smtClean="0">
+              <a:rPr lang="en-US" sz="2400" dirty="0" smtClean="0">
                 <a:solidFill>
                   <a:schemeClr val="accent1">
                     <a:lumMod val="75000"/>
@@ -2804,113 +2879,34 @@
                 <a:latin typeface="Arial" panose="020B0604020202020204" pitchFamily="34" charset="0"/>
                 <a:cs typeface="Arial" panose="020B0604020202020204" pitchFamily="34" charset="0"/>
               </a:rPr>
-              <a:t>POST</a:t>
-            </a:r>
-            <a:r>
-              <a:rPr lang="en-US" sz="2600" dirty="0" smtClean="0">
-                <a:latin typeface="Arial" panose="020B0604020202020204" pitchFamily="34" charset="0"/>
-                <a:cs typeface="Arial" panose="020B0604020202020204" pitchFamily="34" charset="0"/>
-              </a:rPr>
-              <a:t>",</a:t>
-            </a:r>
-          </a:p>
-          <a:p>
-            <a:r>
-              <a:rPr lang="en-US" sz="2600" dirty="0" smtClean="0">
-                <a:latin typeface="Arial" panose="020B0604020202020204" pitchFamily="34" charset="0"/>
-                <a:cs typeface="Arial" panose="020B0604020202020204" pitchFamily="34" charset="0"/>
-              </a:rPr>
-              <a:t>   </a:t>
-            </a:r>
-            <a:r>
-              <a:rPr lang="en-US" sz="2600" dirty="0" smtClean="0">
-                <a:latin typeface="Arial" panose="020B0604020202020204" pitchFamily="34" charset="0"/>
-                <a:cs typeface="Arial" panose="020B0604020202020204" pitchFamily="34" charset="0"/>
-              </a:rPr>
-              <a:t>     "</a:t>
-            </a:r>
-            <a:r>
-              <a:rPr lang="en-US" sz="2600" dirty="0" err="1" smtClean="0">
-                <a:solidFill>
-                  <a:srgbClr val="FF0000"/>
-                </a:solidFill>
-                <a:latin typeface="Arial" panose="020B0604020202020204" pitchFamily="34" charset="0"/>
-                <a:cs typeface="Arial" panose="020B0604020202020204" pitchFamily="34" charset="0"/>
-              </a:rPr>
-              <a:t>jws</a:t>
-            </a:r>
-            <a:r>
-              <a:rPr lang="en-US" sz="2600" dirty="0" smtClean="0">
-                <a:latin typeface="Arial" panose="020B0604020202020204" pitchFamily="34" charset="0"/>
-                <a:cs typeface="Arial" panose="020B0604020202020204" pitchFamily="34" charset="0"/>
-              </a:rPr>
-              <a:t>": "</a:t>
-            </a:r>
-            <a:r>
-              <a:rPr lang="en-US" sz="2600" dirty="0" smtClean="0">
-                <a:solidFill>
-                  <a:schemeClr val="accent1">
-                    <a:lumMod val="75000"/>
-                  </a:schemeClr>
-                </a:solidFill>
-                <a:latin typeface="Arial" panose="020B0604020202020204" pitchFamily="34" charset="0"/>
-                <a:cs typeface="Arial" panose="020B0604020202020204" pitchFamily="34" charset="0"/>
-              </a:rPr>
-              <a:t>eyJhbGciOiJI..</a:t>
-            </a:r>
-            <a:r>
-              <a:rPr lang="en-US" sz="2600" dirty="0" smtClean="0">
-                <a:solidFill>
-                  <a:schemeClr val="accent1">
-                    <a:lumMod val="75000"/>
-                  </a:schemeClr>
-                </a:solidFill>
-                <a:latin typeface="Arial" panose="020B0604020202020204" pitchFamily="34" charset="0"/>
-                <a:cs typeface="Arial" panose="020B0604020202020204" pitchFamily="34" charset="0"/>
-              </a:rPr>
-              <a:t>VHVItCBCb849imarDt</a:t>
-            </a:r>
-            <a:r>
-              <a:rPr lang="en-US" sz="2600" dirty="0" smtClean="0">
+              <a:t>eyJhbGciOiJI..VHVItCBCb849imarDt</a:t>
+            </a:r>
+            <a:r>
+              <a:rPr lang="en-US" sz="2400" dirty="0" smtClean="0">
                 <a:latin typeface="Arial" panose="020B0604020202020204" pitchFamily="34" charset="0"/>
                 <a:cs typeface="Arial" panose="020B0604020202020204" pitchFamily="34" charset="0"/>
               </a:rPr>
               <a:t>"</a:t>
             </a:r>
-            <a:endParaRPr lang="en-US" sz="2600" dirty="0" smtClean="0">
-              <a:latin typeface="Arial" panose="020B0604020202020204" pitchFamily="34" charset="0"/>
-              <a:cs typeface="Arial" panose="020B0604020202020204" pitchFamily="34" charset="0"/>
-            </a:endParaRPr>
-          </a:p>
-          <a:p>
-            <a:r>
-              <a:rPr lang="en-US" sz="2600" dirty="0" smtClean="0">
-                <a:latin typeface="Arial" panose="020B0604020202020204" pitchFamily="34" charset="0"/>
-                <a:cs typeface="Arial" panose="020B0604020202020204" pitchFamily="34" charset="0"/>
-              </a:rPr>
-              <a:t>    }</a:t>
-            </a:r>
-            <a:r>
-              <a:rPr lang="en-US" sz="2600" dirty="0" smtClean="0">
-                <a:latin typeface="Arial" panose="020B0604020202020204" pitchFamily="34" charset="0"/>
-                <a:cs typeface="Arial" panose="020B0604020202020204" pitchFamily="34" charset="0"/>
-              </a:rPr>
-              <a:t> </a:t>
-            </a:r>
-            <a:endParaRPr lang="en-US" sz="2600" dirty="0" smtClean="0">
-              <a:latin typeface="Arial" panose="020B0604020202020204" pitchFamily="34" charset="0"/>
-              <a:cs typeface="Arial" panose="020B0604020202020204" pitchFamily="34" charset="0"/>
-            </a:endParaRPr>
-          </a:p>
-          <a:p>
-            <a:r>
-              <a:rPr lang="en-US" sz="2600" dirty="0" smtClean="0">
+          </a:p>
+          <a:p>
+            <a:r>
+              <a:rPr lang="en-US" sz="2400" dirty="0" smtClean="0">
+                <a:latin typeface="Arial" panose="020B0604020202020204" pitchFamily="34" charset="0"/>
+                <a:cs typeface="Arial" panose="020B0604020202020204" pitchFamily="34" charset="0"/>
+              </a:rPr>
+              <a:t>    } </a:t>
+            </a:r>
+          </a:p>
+          <a:p>
+            <a:r>
+              <a:rPr lang="en-US" sz="2400" dirty="0" smtClean="0">
                 <a:latin typeface="Arial" panose="020B0604020202020204" pitchFamily="34" charset="0"/>
                 <a:cs typeface="Arial" panose="020B0604020202020204" pitchFamily="34" charset="0"/>
               </a:rPr>
               <a:t>}</a:t>
             </a:r>
-            <a:endParaRPr lang="en-US" sz="2600" dirty="0">
+            <a:endParaRPr lang="en-US" sz="2400" dirty="0">
               <a:latin typeface="Arial" panose="020B0604020202020204" pitchFamily="34" charset="0"/>
               <a:cs typeface="Arial" panose="020B0604020202020204" pitchFamily="34" charset="0"/>
             </a:endParaRPr>

</xml_diff>

<commit_message>
0.6 new reserved word
</commit_message>
<xml_diff>
--- a/hotrfc-shreq.pptx
+++ b/hotrfc-shreq.pptx
@@ -184,7 +184,14 @@
                 <a:latin typeface="Arial" panose="020B0604020202020204" pitchFamily="34" charset="0"/>
                 <a:cs typeface="Arial" panose="020B0604020202020204" pitchFamily="34" charset="0"/>
               </a:rPr>
-              <a:t>, IETF-104, Prague, v0.5</a:t>
+              <a:t>, IETF-104, Prague, </a:t>
+            </a:r>
+            <a:r>
+              <a:rPr lang="en-US" sz="800" dirty="0" smtClean="0">
+                <a:latin typeface="Arial" panose="020B0604020202020204" pitchFamily="34" charset="0"/>
+                <a:cs typeface="Arial" panose="020B0604020202020204" pitchFamily="34" charset="0"/>
+              </a:rPr>
+              <a:t>v0.6</a:t>
             </a:r>
             <a:endParaRPr lang="en-US" sz="800" dirty="0">
               <a:latin typeface="Arial" panose="020B0604020202020204" pitchFamily="34" charset="0"/>
@@ -416,7 +423,7 @@
           <a:p>
             <a:fld id="{7C758894-9002-4FBF-9EED-56D555428090}" type="datetimeFigureOut">
               <a:rPr lang="en-US" smtClean="0"/>
-              <a:t>2019-02-28</a:t>
+              <a:t>2019-03-04</a:t>
             </a:fld>
             <a:endParaRPr lang="en-US"/>
           </a:p>
@@ -1190,7 +1197,7 @@
         </p:nvSpPr>
         <p:spPr>
           <a:xfrm>
-            <a:off x="2267744" y="3506406"/>
+            <a:off x="2267744" y="3429000"/>
             <a:ext cx="4112664" cy="2954655"/>
           </a:xfrm>
           <a:prstGeom prst="rect">
@@ -1449,7 +1456,7 @@
         <p:spPr>
           <a:xfrm>
             <a:off x="1110120" y="1196752"/>
-            <a:ext cx="5901167" cy="2862322"/>
+            <a:ext cx="6446380" cy="2862322"/>
           </a:xfrm>
           <a:prstGeom prst="rect">
             <a:avLst/>
@@ -1468,8 +1475,17 @@
           <a:p>
             <a:r>
               <a:rPr lang="en-US" sz="3000" i="1" dirty="0" smtClean="0"/>
-              <a:t>Signs these items:</a:t>
-            </a:r>
+              <a:t>Signs </a:t>
+            </a:r>
+            <a:r>
+              <a:rPr lang="en-US" sz="3000" i="1" dirty="0" smtClean="0"/>
+              <a:t>all</a:t>
+            </a:r>
+            <a:r>
+              <a:rPr lang="en-US" sz="3000" i="1" dirty="0" smtClean="0"/>
+              <a:t> items forming an HTTP request:</a:t>
+            </a:r>
+            <a:endParaRPr lang="en-US" sz="3000" i="1" dirty="0" smtClean="0"/>
           </a:p>
           <a:p>
             <a:pPr marL="285750" indent="-285750">
@@ -1508,17 +1524,30 @@
             </a:pPr>
             <a:r>
               <a:rPr lang="en-US" sz="3000" dirty="0" smtClean="0"/>
-              <a:t>Time Stamp</a:t>
-            </a:r>
-          </a:p>
-          <a:p>
-            <a:pPr marL="285750" indent="-285750">
-              <a:buFont typeface="Arial" panose="020B0604020202020204" pitchFamily="34" charset="0"/>
-              <a:buChar char="•"/>
-            </a:pPr>
+              <a:t>Optional</a:t>
+            </a:r>
             <a:r>
               <a:rPr lang="en-US" sz="3000" dirty="0" smtClean="0"/>
-              <a:t>Optional: Additional HTTP Headers</a:t>
+              <a:t>: Additional HTTP </a:t>
+            </a:r>
+            <a:r>
+              <a:rPr lang="en-US" sz="3000" dirty="0" smtClean="0"/>
+              <a:t>Headers</a:t>
+            </a:r>
+          </a:p>
+          <a:p>
+            <a:pPr marL="271463" indent="-271463"/>
+            <a:r>
+              <a:rPr lang="en-US" sz="3000" dirty="0" smtClean="0">
+                <a:solidFill>
+                  <a:srgbClr val="FF0000"/>
+                </a:solidFill>
+              </a:rPr>
+              <a:t>+</a:t>
+            </a:r>
+            <a:r>
+              <a:rPr lang="en-US" sz="3000" dirty="0" smtClean="0"/>
+              <a:t>	Time Stamp</a:t>
             </a:r>
             <a:endParaRPr lang="en-US" sz="3000" dirty="0"/>
           </a:p>
@@ -1552,7 +1581,11 @@
           <a:p>
             <a:r>
               <a:rPr lang="en-US" sz="3000" i="1" dirty="0" smtClean="0"/>
-              <a:t>Other characteristics:</a:t>
+              <a:t>Other notable </a:t>
+            </a:r>
+            <a:r>
+              <a:rPr lang="en-US" sz="3000" i="1" dirty="0" smtClean="0"/>
+              <a:t>characteristics:</a:t>
             </a:r>
           </a:p>
           <a:p>
@@ -1582,8 +1615,13 @@
             </a:pPr>
             <a:r>
               <a:rPr lang="en-US" sz="3000" dirty="0" smtClean="0"/>
-              <a:t>Cryptography builds on JOSE-JWS</a:t>
-            </a:r>
+              <a:t>Cryptography builds on </a:t>
+            </a:r>
+            <a:r>
+              <a:rPr lang="en-US" sz="3000" dirty="0" smtClean="0"/>
+              <a:t>JOSE/JWS</a:t>
+            </a:r>
+            <a:endParaRPr lang="en-US" sz="3000" dirty="0" smtClean="0"/>
           </a:p>
         </p:txBody>
       </p:sp>
@@ -2665,7 +2703,14 @@
                 <a:latin typeface="Arial" panose="020B0604020202020204" pitchFamily="34" charset="0"/>
                 <a:cs typeface="Arial" panose="020B0604020202020204" pitchFamily="34" charset="0"/>
               </a:rPr>
-              <a:t>   "</a:t>
+              <a:t>   </a:t>
+            </a:r>
+            <a:r>
+              <a:rPr lang="en-US" sz="2400" dirty="0" smtClean="0">
+                <a:latin typeface="Arial" panose="020B0604020202020204" pitchFamily="34" charset="0"/>
+                <a:cs typeface="Arial" panose="020B0604020202020204" pitchFamily="34" charset="0"/>
+              </a:rPr>
+              <a:t>"</a:t>
             </a:r>
             <a:r>
               <a:rPr lang="en-US" sz="2400" dirty="0" smtClean="0">
@@ -2675,7 +2720,17 @@
                 <a:latin typeface="Arial" panose="020B0604020202020204" pitchFamily="34" charset="0"/>
                 <a:cs typeface="Arial" panose="020B0604020202020204" pitchFamily="34" charset="0"/>
               </a:rPr>
-              <a:t>$</a:t>
+              <a:t>.</a:t>
+            </a:r>
+            <a:r>
+              <a:rPr lang="en-US" sz="600" dirty="0" smtClean="0">
+                <a:solidFill>
+                  <a:srgbClr val="FF0000"/>
+                </a:solidFill>
+                <a:latin typeface="Arial" panose="020B0604020202020204" pitchFamily="34" charset="0"/>
+                <a:cs typeface="Arial" panose="020B0604020202020204" pitchFamily="34" charset="0"/>
+              </a:rPr>
+              <a:t> </a:t>
             </a:r>
             <a:r>
               <a:rPr lang="en-US" sz="2400" dirty="0" err="1" smtClean="0">
@@ -2685,24 +2740,21 @@
                 <a:latin typeface="Arial" panose="020B0604020202020204" pitchFamily="34" charset="0"/>
                 <a:cs typeface="Arial" panose="020B0604020202020204" pitchFamily="34" charset="0"/>
               </a:rPr>
-              <a:t>secinf</a:t>
-            </a:r>
-            <a:r>
-              <a:rPr lang="en-US" sz="2400" dirty="0" smtClean="0">
-                <a:solidFill>
-                  <a:srgbClr val="FF0000"/>
-                </a:solidFill>
-                <a:latin typeface="Arial" panose="020B0604020202020204" pitchFamily="34" charset="0"/>
-                <a:cs typeface="Arial" panose="020B0604020202020204" pitchFamily="34" charset="0"/>
-              </a:rPr>
-              <a:t>$</a:t>
-            </a:r>
-            <a:r>
-              <a:rPr lang="en-US" sz="2400" dirty="0" smtClean="0">
-                <a:latin typeface="Arial" panose="020B0604020202020204" pitchFamily="34" charset="0"/>
-                <a:cs typeface="Arial" panose="020B0604020202020204" pitchFamily="34" charset="0"/>
-              </a:rPr>
-              <a:t>": {</a:t>
+              <a:t>secinfo</a:t>
+            </a:r>
+            <a:r>
+              <a:rPr lang="en-US" sz="2400" dirty="0" smtClean="0">
+                <a:latin typeface="Arial" panose="020B0604020202020204" pitchFamily="34" charset="0"/>
+                <a:cs typeface="Arial" panose="020B0604020202020204" pitchFamily="34" charset="0"/>
+              </a:rPr>
+              <a:t>": </a:t>
+            </a:r>
+            <a:r>
+              <a:rPr lang="en-US" sz="2400" dirty="0" smtClean="0">
+                <a:latin typeface="Arial" panose="020B0604020202020204" pitchFamily="34" charset="0"/>
+                <a:cs typeface="Arial" panose="020B0604020202020204" pitchFamily="34" charset="0"/>
+              </a:rPr>
+              <a:t>{</a:t>
             </a:r>
           </a:p>
           <a:p>
@@ -3021,7 +3073,7 @@
         <p:spPr>
           <a:xfrm>
             <a:off x="1763688" y="4221088"/>
-            <a:ext cx="5346785" cy="646331"/>
+            <a:ext cx="5599674" cy="646331"/>
           </a:xfrm>
           <a:prstGeom prst="rect">
             <a:avLst/>
@@ -3038,7 +3090,13 @@
               <a:rPr lang="en-US" dirty="0" smtClean="0">
                 <a:hlinkClick r:id="rId2"/>
               </a:rPr>
-              <a:t>https://cyberphone.github.io/ietf-signed-http-requests</a:t>
+              <a:t>https</a:t>
+            </a:r>
+            <a:r>
+              <a:rPr lang="en-US" dirty="0" smtClean="0">
+                <a:hlinkClick r:id="rId2"/>
+              </a:rPr>
+              <a:t>://github.com/cyberphone/ietf-signed-http-requests</a:t>
             </a:r>
             <a:endParaRPr lang="en-US" dirty="0" smtClean="0"/>
           </a:p>

</xml_diff>